<commit_message>
Minor change to include polymorphism for list
</commit_message>
<xml_diff>
--- a/slides/On-Campus/14_03_Collections.pptx
+++ b/slides/On-Campus/14_03_Collections.pptx
@@ -8587,7 +8587,7 @@
                 <a:latin typeface="Consolas" panose="020B0609020204030204" pitchFamily="49" charset="0"/>
                 <a:cs typeface="Consolas" panose="020B0609020204030204" pitchFamily="49" charset="0"/>
               </a:rPr>
-              <a:t>LinkedList&lt;String&gt; list = </a:t>
+              <a:t>List&lt;String&gt; list = </a:t>
             </a:r>
             <a:r>
               <a:rPr lang="en-US" sz="1400" dirty="0">
@@ -8860,7 +8860,15 @@
           <a:p>
             <a:r>
               <a:rPr lang="en-US" dirty="0"/>
-              <a:t>LinkedList basic methods </a:t>
+              <a:t>Linked</a:t>
+            </a:r>
+            <a:r>
+              <a:rPr lang="en-US" b="1" dirty="0"/>
+              <a:t>List</a:t>
+            </a:r>
+            <a:r>
+              <a:rPr lang="en-US" dirty="0"/>
+              <a:t> basic methods </a:t>
             </a:r>
             <a:br>
               <a:rPr lang="en-US" dirty="0"/>
@@ -9252,17 +9260,26 @@
               </a:rPr>
             </a:br>
             <a:r>
-              <a:rPr kumimoji="0" lang="en-US" altLang="en-US" sz="1800" b="0" i="0" u="none" strike="noStrike" cap="none" normalizeH="0" baseline="0" dirty="0">
-                <a:ln>
-                  <a:noFill/>
-                </a:ln>
+              <a:rPr lang="en-US" altLang="en-US" sz="1800" dirty="0">
                 <a:solidFill>
                   <a:srgbClr val="A9B7C6"/>
                 </a:solidFill>
-                <a:effectLst/>
-                <a:latin typeface="JetBrains Mono"/>
-              </a:rPr>
-              <a:t>        LinkedList&lt;Integer&gt; list = </a:t>
+                <a:latin typeface="JetBrains Mono"/>
+              </a:rPr>
+              <a:t>        </a:t>
+            </a:r>
+            <a:r>
+              <a:rPr kumimoji="0" lang="en-US" altLang="en-US" sz="1800" b="0" i="0" u="none" strike="noStrike" cap="none" normalizeH="0" baseline="0" dirty="0">
+                <a:ln>
+                  <a:noFill/>
+                </a:ln>
+                <a:solidFill>
+                  <a:srgbClr val="A9B7C6"/>
+                </a:solidFill>
+                <a:effectLst/>
+                <a:latin typeface="JetBrains Mono"/>
+              </a:rPr>
+              <a:t>List&lt;Integer&gt; list = </a:t>
             </a:r>
             <a:r>
               <a:rPr kumimoji="0" lang="en-US" altLang="en-US" sz="1800" b="0" i="0" u="none" strike="noStrike" cap="none" normalizeH="0" baseline="0" dirty="0">

</xml_diff>

<commit_message>
updated with examples for students to download.
</commit_message>
<xml_diff>
--- a/slides/On-Campus/14_03_Collections.pptx
+++ b/slides/On-Campus/14_03_Collections.pptx
@@ -8956,8 +8956,8 @@
         </p:nvSpPr>
         <p:spPr bwMode="auto">
           <a:xfrm>
-            <a:off x="8042707" y="377547"/>
-            <a:ext cx="5613991" cy="7017306"/>
+            <a:off x="8042707" y="239048"/>
+            <a:ext cx="5613991" cy="7294305"/>
           </a:xfrm>
           <a:prstGeom prst="rect">
             <a:avLst/>
@@ -9049,6 +9049,59 @@
                 </a:ln>
                 <a:solidFill>
                   <a:srgbClr val="CC7832"/>
+                </a:solidFill>
+                <a:effectLst/>
+                <a:latin typeface="JetBrains Mono"/>
+              </a:rPr>
+              <a:t>;</a:t>
+            </a:r>
+          </a:p>
+          <a:p>
+            <a:pPr marL="0" marR="0" lvl="0" indent="0" algn="l" defTabSz="914400" rtl="0" eaLnBrk="0" fontAlgn="base" latinLnBrk="0" hangingPunct="0">
+              <a:lnSpc>
+                <a:spcPct val="100000"/>
+              </a:lnSpc>
+              <a:spcBef>
+                <a:spcPct val="0"/>
+              </a:spcBef>
+              <a:spcAft>
+                <a:spcPct val="0"/>
+              </a:spcAft>
+              <a:buClrTx/>
+              <a:buSzTx/>
+              <a:buFontTx/>
+              <a:buNone/>
+              <a:tabLst/>
+            </a:pPr>
+            <a:r>
+              <a:rPr lang="en-US" altLang="en-US" sz="1800" dirty="0">
+                <a:solidFill>
+                  <a:srgbClr val="CC7832"/>
+                </a:solidFill>
+                <a:latin typeface="JetBrains Mono"/>
+              </a:rPr>
+              <a:t>Import </a:t>
+            </a:r>
+            <a:r>
+              <a:rPr kumimoji="0" lang="en-US" altLang="en-US" sz="1800" b="0" i="0" u="none" strike="noStrike" cap="none" normalizeH="0" baseline="0" dirty="0" err="1">
+                <a:ln>
+                  <a:noFill/>
+                </a:ln>
+                <a:solidFill>
+                  <a:srgbClr val="A9B7C6"/>
+                </a:solidFill>
+                <a:effectLst/>
+                <a:latin typeface="JetBrains Mono"/>
+              </a:rPr>
+              <a:t>java.util.List</a:t>
+            </a:r>
+            <a:r>
+              <a:rPr kumimoji="0" lang="en-US" altLang="en-US" sz="1800" b="0" i="0" u="none" strike="noStrike" cap="none" normalizeH="0" baseline="0">
+                <a:ln>
+                  <a:noFill/>
+                </a:ln>
+                <a:solidFill>
+                  <a:srgbClr val="A9B7C6"/>
                 </a:solidFill>
                 <a:effectLst/>
                 <a:latin typeface="JetBrains Mono"/>

</xml_diff>

<commit_message>
updated with incalss changes
</commit_message>
<xml_diff>
--- a/slides/On-Campus/14_03_Collections.pptx
+++ b/slides/On-Campus/14_03_Collections.pptx
@@ -511,7 +511,7 @@
           <a:p>
             <a:fld id="{4D7E51A5-B478-1E40-8CBB-0DAA8831E99D}" type="datetimeFigureOut">
               <a:rPr lang="en-US" smtClean="0"/>
-              <a:t>12/2/2021</a:t>
+              <a:t>12/3/21</a:t>
             </a:fld>
             <a:endParaRPr lang="en-US"/>
           </a:p>
@@ -676,7 +676,7 @@
           <a:p>
             <a:fld id="{D0ED587F-861E-6740-9643-E3DDAE89B8D6}" type="datetimeFigureOut">
               <a:rPr lang="en-US" smtClean="0"/>
-              <a:t>12/2/2021</a:t>
+              <a:t>12/3/21</a:t>
             </a:fld>
             <a:endParaRPr lang="en-US"/>
           </a:p>
@@ -7822,7 +7822,7 @@
         </p:spPr>
         <p:txBody>
           <a:bodyPr>
-            <a:normAutofit/>
+            <a:normAutofit fontScale="92500" lnSpcReduction="20000"/>
           </a:bodyPr>
           <a:lstStyle/>
           <a:p>
@@ -7884,7 +7884,42 @@
             <a:pPr marL="230292" indent="0">
               <a:buNone/>
             </a:pPr>
-            <a:endParaRPr lang="en-US" dirty="0"/>
+            <a:r>
+              <a:rPr lang="en-US" b="1" dirty="0"/>
+              <a:t>FOR TODAY: Go the course website (</a:t>
+            </a:r>
+            <a:r>
+              <a:rPr lang="en-US" b="1" dirty="0">
+                <a:hlinkClick r:id="rId2"/>
+              </a:rPr>
+              <a:t>www.cs.colostate.edu/~cs163/</a:t>
+            </a:r>
+            <a:r>
+              <a:rPr lang="en-US" b="1" dirty="0"/>
+              <a:t>) -&gt; resources page, click on the ‘</a:t>
+            </a:r>
+            <a:r>
+              <a:rPr lang="en-US" b="1" dirty="0" err="1"/>
+              <a:t>github</a:t>
+            </a:r>
+            <a:r>
+              <a:rPr lang="en-US" b="1" dirty="0"/>
+              <a:t>’ link  middle of the page! </a:t>
+            </a:r>
+          </a:p>
+          <a:p>
+            <a:pPr marL="230292" indent="0">
+              <a:buNone/>
+            </a:pPr>
+            <a:r>
+              <a:rPr lang="en-US" b="1" dirty="0"/>
+              <a:t>	Will save </a:t>
+            </a:r>
+            <a:r>
+              <a:rPr lang="en-US" b="1"/>
+              <a:t>typing later</a:t>
+            </a:r>
+            <a:endParaRPr lang="en-US" b="1" dirty="0"/>
           </a:p>
         </p:txBody>
       </p:sp>

</xml_diff>

<commit_message>
Week 14 lectures updated
</commit_message>
<xml_diff>
--- a/slides/On-Campus/14_03_Collections.pptx
+++ b/slides/On-Campus/14_03_Collections.pptx
@@ -147,71 +147,42 @@
 <file path=ppt/changesInfos/changesInfo1.xml><?xml version="1.0" encoding="utf-8"?>
 <pc:chgInfo xmlns:a="http://schemas.openxmlformats.org/drawingml/2006/main" xmlns:r="http://schemas.openxmlformats.org/officeDocument/2006/relationships" xmlns:ac="http://schemas.microsoft.com/office/drawing/2013/main/command" xmlns:pc="http://schemas.microsoft.com/office/powerpoint/2013/main/command">
   <pc:docChgLst>
-    <pc:chgData name="Marcia Moraes" userId="c9c67e8a-58e2-4733-9a1c-5d44fec4775b" providerId="ADAL" clId="{53741CE1-D3A2-46FF-9696-CE781C34CE81}"/>
-  </pc:docChgLst>
-  <pc:docChgLst>
-    <pc:chgData name="Marcia Moraes" userId="c9c67e8a-58e2-4733-9a1c-5d44fec4775b" providerId="ADAL" clId="{E40059A0-084C-4499-B9E0-8AE3D5F0EBF2}"/>
+    <pc:chgData name="Marcia Moraes" userId="c9c67e8a-58e2-4733-9a1c-5d44fec4775b" providerId="ADAL" clId="{918ACE75-BF75-45B7-AA2E-0C470B9EC7DD}"/>
     <pc:docChg chg="custSel modSld">
-      <pc:chgData name="Marcia Moraes" userId="c9c67e8a-58e2-4733-9a1c-5d44fec4775b" providerId="ADAL" clId="{E40059A0-084C-4499-B9E0-8AE3D5F0EBF2}" dt="2023-11-28T17:56:24.341" v="84" actId="1076"/>
+      <pc:chgData name="Marcia Moraes" userId="c9c67e8a-58e2-4733-9a1c-5d44fec4775b" providerId="ADAL" clId="{918ACE75-BF75-45B7-AA2E-0C470B9EC7DD}" dt="2024-03-07T20:28:01.177" v="60" actId="6549"/>
       <pc:docMkLst>
         <pc:docMk/>
       </pc:docMkLst>
-      <pc:sldChg chg="addSp delSp modSp">
-        <pc:chgData name="Marcia Moraes" userId="c9c67e8a-58e2-4733-9a1c-5d44fec4775b" providerId="ADAL" clId="{E40059A0-084C-4499-B9E0-8AE3D5F0EBF2}" dt="2023-11-28T17:56:24.341" v="84" actId="1076"/>
+      <pc:sldChg chg="modSp">
+        <pc:chgData name="Marcia Moraes" userId="c9c67e8a-58e2-4733-9a1c-5d44fec4775b" providerId="ADAL" clId="{918ACE75-BF75-45B7-AA2E-0C470B9EC7DD}" dt="2024-03-07T20:28:01.177" v="60" actId="6549"/>
         <pc:sldMkLst>
           <pc:docMk/>
           <pc:sldMk cId="926474781" sldId="271"/>
         </pc:sldMkLst>
         <pc:spChg chg="mod">
-          <ac:chgData name="Marcia Moraes" userId="c9c67e8a-58e2-4733-9a1c-5d44fec4775b" providerId="ADAL" clId="{E40059A0-084C-4499-B9E0-8AE3D5F0EBF2}" dt="2023-11-28T17:46:57.210" v="74" actId="20577"/>
+          <ac:chgData name="Marcia Moraes" userId="c9c67e8a-58e2-4733-9a1c-5d44fec4775b" providerId="ADAL" clId="{918ACE75-BF75-45B7-AA2E-0C470B9EC7DD}" dt="2024-03-07T20:28:01.177" v="60" actId="6549"/>
           <ac:spMkLst>
             <pc:docMk/>
             <pc:sldMk cId="926474781" sldId="271"/>
             <ac:spMk id="5" creationId="{1BBD0DB5-379A-304F-9307-E7B1A89B08F7}"/>
           </ac:spMkLst>
         </pc:spChg>
-        <pc:spChg chg="del mod">
-          <ac:chgData name="Marcia Moraes" userId="c9c67e8a-58e2-4733-9a1c-5d44fec4775b" providerId="ADAL" clId="{E40059A0-084C-4499-B9E0-8AE3D5F0EBF2}" dt="2023-11-28T17:47:02.538" v="76" actId="478"/>
-          <ac:spMkLst>
-            <pc:docMk/>
-            <pc:sldMk cId="926474781" sldId="271"/>
-            <ac:spMk id="6" creationId="{772FBA25-57F9-41AD-8CF5-B6750F6B5056}"/>
-          </ac:spMkLst>
-        </pc:spChg>
-        <pc:spChg chg="add">
-          <ac:chgData name="Marcia Moraes" userId="c9c67e8a-58e2-4733-9a1c-5d44fec4775b" providerId="ADAL" clId="{E40059A0-084C-4499-B9E0-8AE3D5F0EBF2}" dt="2023-11-28T17:47:21.953" v="77"/>
-          <ac:spMkLst>
-            <pc:docMk/>
-            <pc:sldMk cId="926474781" sldId="271"/>
-            <ac:spMk id="7" creationId="{65898405-BB68-4104-886B-F7BD66E624B1}"/>
-          </ac:spMkLst>
-        </pc:spChg>
-        <pc:graphicFrameChg chg="add">
-          <ac:chgData name="Marcia Moraes" userId="c9c67e8a-58e2-4733-9a1c-5d44fec4775b" providerId="ADAL" clId="{E40059A0-084C-4499-B9E0-8AE3D5F0EBF2}" dt="2023-11-28T17:47:21.953" v="77"/>
+        <pc:graphicFrameChg chg="modGraphic">
+          <ac:chgData name="Marcia Moraes" userId="c9c67e8a-58e2-4733-9a1c-5d44fec4775b" providerId="ADAL" clId="{918ACE75-BF75-45B7-AA2E-0C470B9EC7DD}" dt="2024-03-07T20:25:08.929" v="2" actId="20577"/>
           <ac:graphicFrameMkLst>
             <pc:docMk/>
             <pc:sldMk cId="926474781" sldId="271"/>
             <ac:graphicFrameMk id="8" creationId="{37651A57-AD1D-4E2B-9103-36EE55FC293C}"/>
           </ac:graphicFrameMkLst>
         </pc:graphicFrameChg>
-        <pc:picChg chg="add del mod">
-          <ac:chgData name="Marcia Moraes" userId="c9c67e8a-58e2-4733-9a1c-5d44fec4775b" providerId="ADAL" clId="{E40059A0-084C-4499-B9E0-8AE3D5F0EBF2}" dt="2023-11-28T17:54:29.261" v="80" actId="478"/>
-          <ac:picMkLst>
-            <pc:docMk/>
-            <pc:sldMk cId="926474781" sldId="271"/>
-            <ac:picMk id="1026" creationId="{E6466E6C-563D-4D5A-8A0D-B2B0CB5D87B1}"/>
-          </ac:picMkLst>
-        </pc:picChg>
-        <pc:picChg chg="add mod">
-          <ac:chgData name="Marcia Moraes" userId="c9c67e8a-58e2-4733-9a1c-5d44fec4775b" providerId="ADAL" clId="{E40059A0-084C-4499-B9E0-8AE3D5F0EBF2}" dt="2023-11-28T17:56:24.341" v="84" actId="1076"/>
-          <ac:picMkLst>
-            <pc:docMk/>
-            <pc:sldMk cId="926474781" sldId="271"/>
-            <ac:picMk id="1028" creationId="{141F3B47-67D3-4C2A-9617-CD06F5C43C1F}"/>
-          </ac:picMkLst>
-        </pc:picChg>
       </pc:sldChg>
     </pc:docChg>
+  </pc:docChgLst>
+  <pc:docChgLst>
+    <pc:chgData name="Marcia Moraes" userId="c9c67e8a-58e2-4733-9a1c-5d44fec4775b" providerId="ADAL" clId="{53741CE1-D3A2-46FF-9696-CE781C34CE81}"/>
+  </pc:docChgLst>
+  <pc:docChgLst>
+    <pc:chgData name="Marcia Moraes" userId="c9c67e8a-58e2-4733-9a1c-5d44fec4775b" providerId="ADAL" clId="{E40059A0-084C-4499-B9E0-8AE3D5F0EBF2}"/>
   </pc:docChgLst>
 </pc:chgInfo>
 </file>
@@ -298,7 +269,7 @@
           <a:p>
             <a:fld id="{4D7E51A5-B478-1E40-8CBB-0DAA8831E99D}" type="datetimeFigureOut">
               <a:rPr lang="en-US" smtClean="0"/>
-              <a:t>11/28/2023</a:t>
+              <a:t>3/7/2024</a:t>
             </a:fld>
             <a:endParaRPr lang="en-US"/>
           </a:p>
@@ -463,7 +434,7 @@
           <a:p>
             <a:fld id="{D0ED587F-861E-6740-9643-E3DDAE89B8D6}" type="datetimeFigureOut">
               <a:rPr lang="en-US" smtClean="0"/>
-              <a:t>11/28/2023</a:t>
+              <a:t>3/7/2024</a:t>
             </a:fld>
             <a:endParaRPr lang="en-US"/>
           </a:p>
@@ -8417,15 +8388,7 @@
             <a:pPr lvl="1"/>
             <a:r>
               <a:rPr lang="en-US" sz="2400" dirty="0"/>
-              <a:t>HELP DESK CLOSES - Friday Dec 8</a:t>
-            </a:r>
-            <a:r>
-              <a:rPr lang="en-US" sz="2400" baseline="30000" dirty="0"/>
-              <a:t>th</a:t>
-            </a:r>
-            <a:r>
-              <a:rPr lang="en-US" sz="2400" dirty="0"/>
-              <a:t>, plan accordantly! </a:t>
+              <a:t>HELP DESK CLOSES - Friday May 3, plan accordantly! </a:t>
             </a:r>
           </a:p>
           <a:p>
@@ -8437,8 +8400,12 @@
           <a:p>
             <a:pPr lvl="1"/>
             <a:r>
+              <a:rPr lang="en-US" sz="2400"/>
+              <a:t>Tuesday </a:t>
+            </a:r>
+            <a:r>
               <a:rPr lang="en-US" sz="2400" dirty="0"/>
-              <a:t>Thursday Dec 14 11:50am-1:50pm at CS110</a:t>
+              <a:t>May 7 7:30am-9:30am at CS110 – 002 section</a:t>
             </a:r>
           </a:p>
         </p:txBody>
@@ -8491,7 +8458,11 @@
             <a:graphicFrameLocks noGrp="1"/>
           </p:cNvGraphicFramePr>
           <p:nvPr>
-            <p:extLst/>
+            <p:extLst>
+              <p:ext uri="{D42A27DB-BD31-4B8C-83A1-F6EECF244321}">
+                <p14:modId xmlns:p14="http://schemas.microsoft.com/office/powerpoint/2010/main" val="1254741044"/>
+              </p:ext>
+            </p:extLst>
           </p:nvPr>
         </p:nvGraphicFramePr>
         <p:xfrm>
@@ -8800,7 +8771,7 @@
                         <a:rPr lang="en-US" sz="1600" dirty="0">
                           <a:effectLst/>
                         </a:rPr>
-                        <a:t>12 PM - 2 PM : CSB 120</a:t>
+                        <a:t>2 PM - 5 PM : CSB 120</a:t>
                       </a:r>
                       <a:endParaRPr lang="en-US" sz="1600" dirty="0">
                         <a:effectLst/>
@@ -16007,6 +15978,15 @@
 </file>
 
 <file path=customXml/item2.xml><?xml version="1.0" encoding="utf-8"?>
+<?mso-contentType ?>
+<FormTemplates xmlns="http://schemas.microsoft.com/sharepoint/v3/contenttype/forms">
+  <Display>DocumentLibraryForm</Display>
+  <Edit>DocumentLibraryForm</Edit>
+  <New>DocumentLibraryForm</New>
+</FormTemplates>
+</file>
+
+<file path=customXml/item3.xml><?xml version="1.0" encoding="utf-8"?>
 <ct:contentTypeSchema xmlns:ct="http://schemas.microsoft.com/office/2006/metadata/contentType" xmlns:ma="http://schemas.microsoft.com/office/2006/metadata/properties/metaAttributes" ct:_="" ma:_="" ma:contentTypeName="Document" ma:contentTypeID="0x010100074387D78AC76C4289401EF66FB51FCC" ma:contentTypeVersion="15" ma:contentTypeDescription="Create a new document." ma:contentTypeScope="" ma:versionID="d3659bec8b8330148a03d82a9d99f412">
   <xsd:schema xmlns:xsd="http://www.w3.org/2001/XMLSchema" xmlns:xs="http://www.w3.org/2001/XMLSchema" xmlns:p="http://schemas.microsoft.com/office/2006/metadata/properties" xmlns:ns3="92c41bee-f0ee-4aa6-9399-a35fbb883510" xmlns:ns4="e06ed288-fd75-4b50-bbed-f5a5df88c31c" targetNamespace="http://schemas.microsoft.com/office/2006/metadata/properties" ma:root="true" ma:fieldsID="1a21d371127b63848c9a2290f5945250" ns3:_="" ns4:_="">
     <xsd:import namespace="92c41bee-f0ee-4aa6-9399-a35fbb883510"/>
@@ -16241,33 +16221,32 @@
 </ct:contentTypeSchema>
 </file>
 
-<file path=customXml/item3.xml><?xml version="1.0" encoding="utf-8"?>
-<?mso-contentType ?>
-<FormTemplates xmlns="http://schemas.microsoft.com/sharepoint/v3/contenttype/forms">
-  <Display>DocumentLibraryForm</Display>
-  <Edit>DocumentLibraryForm</Edit>
-  <New>DocumentLibraryForm</New>
-</FormTemplates>
-</file>
-
 <file path=customXml/itemProps1.xml><?xml version="1.0" encoding="utf-8"?>
 <ds:datastoreItem xmlns:ds="http://schemas.openxmlformats.org/officeDocument/2006/customXml" ds:itemID="{2466944C-8618-4D97-837E-62F35504EB04}">
   <ds:schemaRefs>
     <ds:schemaRef ds:uri="http://schemas.microsoft.com/office/2006/documentManagement/types"/>
-    <ds:schemaRef ds:uri="http://schemas.microsoft.com/office/2006/metadata/properties"/>
+    <ds:schemaRef ds:uri="http://purl.org/dc/terms/"/>
     <ds:schemaRef ds:uri="http://www.w3.org/XML/1998/namespace"/>
     <ds:schemaRef ds:uri="e06ed288-fd75-4b50-bbed-f5a5df88c31c"/>
+    <ds:schemaRef ds:uri="http://purl.org/dc/dcmitype/"/>
+    <ds:schemaRef ds:uri="http://schemas.openxmlformats.org/package/2006/metadata/core-properties"/>
     <ds:schemaRef ds:uri="http://purl.org/dc/elements/1.1/"/>
-    <ds:schemaRef ds:uri="http://purl.org/dc/terms/"/>
+    <ds:schemaRef ds:uri="92c41bee-f0ee-4aa6-9399-a35fbb883510"/>
     <ds:schemaRef ds:uri="http://schemas.microsoft.com/office/infopath/2007/PartnerControls"/>
-    <ds:schemaRef ds:uri="http://schemas.openxmlformats.org/package/2006/metadata/core-properties"/>
-    <ds:schemaRef ds:uri="92c41bee-f0ee-4aa6-9399-a35fbb883510"/>
-    <ds:schemaRef ds:uri="http://purl.org/dc/dcmitype/"/>
+    <ds:schemaRef ds:uri="http://schemas.microsoft.com/office/2006/metadata/properties"/>
   </ds:schemaRefs>
 </ds:datastoreItem>
 </file>
 
 <file path=customXml/itemProps2.xml><?xml version="1.0" encoding="utf-8"?>
+<ds:datastoreItem xmlns:ds="http://schemas.openxmlformats.org/officeDocument/2006/customXml" ds:itemID="{0BFEF18A-DF64-4AA8-8E88-1ECB35B2728C}">
+  <ds:schemaRefs>
+    <ds:schemaRef ds:uri="http://schemas.microsoft.com/sharepoint/v3/contenttype/forms"/>
+  </ds:schemaRefs>
+</ds:datastoreItem>
+</file>
+
+<file path=customXml/itemProps3.xml><?xml version="1.0" encoding="utf-8"?>
 <ds:datastoreItem xmlns:ds="http://schemas.openxmlformats.org/officeDocument/2006/customXml" ds:itemID="{32DB71B9-C985-44BD-B96C-1C8CF0BDC283}">
   <ds:schemaRefs>
     <ds:schemaRef ds:uri="http://schemas.microsoft.com/office/2006/metadata/contentType"/>
@@ -16284,12 +16263,4 @@
     <ds:schemaRef ds:uri="http://schemas.microsoft.com/internal/obd"/>
   </ds:schemaRefs>
 </ds:datastoreItem>
-</file>
-
-<file path=customXml/itemProps3.xml><?xml version="1.0" encoding="utf-8"?>
-<ds:datastoreItem xmlns:ds="http://schemas.openxmlformats.org/officeDocument/2006/customXml" ds:itemID="{0BFEF18A-DF64-4AA8-8E88-1ECB35B2728C}">
-  <ds:schemaRefs>
-    <ds:schemaRef ds:uri="http://schemas.microsoft.com/sharepoint/v3/contenttype/forms"/>
-  </ds:schemaRefs>
-</ds:datastoreItem>
 </file>
</xml_diff>